<commit_message>
These are almost done... just need to finish adding test cases and differences from proposals
</commit_message>
<xml_diff>
--- a/Part5Presentation.pptx
+++ b/Part5Presentation.pptx
@@ -4,11 +4,16 @@
   <p:sldMasterIdLst>
     <p:sldMasterId id="2147483660" r:id="rId1"/>
   </p:sldMasterIdLst>
+  <p:notesMasterIdLst>
+    <p:notesMasterId r:id="rId8"/>
+  </p:notesMasterIdLst>
   <p:sldIdLst>
     <p:sldId id="256" r:id="rId2"/>
     <p:sldId id="257" r:id="rId3"/>
     <p:sldId id="259" r:id="rId4"/>
-    <p:sldId id="258" r:id="rId5"/>
+    <p:sldId id="260" r:id="rId5"/>
+    <p:sldId id="261" r:id="rId6"/>
+    <p:sldId id="258" r:id="rId7"/>
   </p:sldIdLst>
   <p:sldSz cx="9144000" cy="6858000" type="screen4x3"/>
   <p:notesSz cx="6858000" cy="9144000"/>
@@ -108,6 +113,462 @@
     </a:lvl9pPr>
   </p:defaultTextStyle>
 </p:presentation>
+</file>
+
+<file path=ppt/notesMasters/notesMaster1.xml><?xml version="1.0" encoding="utf-8"?>
+<p:notesMaster xmlns:a="http://schemas.openxmlformats.org/drawingml/2006/main" xmlns:r="http://schemas.openxmlformats.org/officeDocument/2006/relationships" xmlns:p="http://schemas.openxmlformats.org/presentationml/2006/main">
+  <p:cSld>
+    <p:bg>
+      <p:bgRef idx="1001">
+        <a:schemeClr val="bg1"/>
+      </p:bgRef>
+    </p:bg>
+    <p:spTree>
+      <p:nvGrpSpPr>
+        <p:cNvPr id="1" name=""/>
+        <p:cNvGrpSpPr/>
+        <p:nvPr/>
+      </p:nvGrpSpPr>
+      <p:grpSpPr>
+        <a:xfrm>
+          <a:off x="0" y="0"/>
+          <a:ext cx="0" cy="0"/>
+          <a:chOff x="0" y="0"/>
+          <a:chExt cx="0" cy="0"/>
+        </a:xfrm>
+      </p:grpSpPr>
+      <p:sp>
+        <p:nvSpPr>
+          <p:cNvPr id="2" name="Header Placeholder 1"/>
+          <p:cNvSpPr>
+            <a:spLocks noGrp="1"/>
+          </p:cNvSpPr>
+          <p:nvPr>
+            <p:ph type="hdr" sz="quarter"/>
+          </p:nvPr>
+        </p:nvSpPr>
+        <p:spPr>
+          <a:xfrm>
+            <a:off x="0" y="0"/>
+            <a:ext cx="2971800" cy="457200"/>
+          </a:xfrm>
+          <a:prstGeom prst="rect">
+            <a:avLst/>
+          </a:prstGeom>
+        </p:spPr>
+        <p:txBody>
+          <a:bodyPr vert="horz" lIns="91440" tIns="45720" rIns="91440" bIns="45720" rtlCol="0"/>
+          <a:lstStyle>
+            <a:lvl1pPr algn="l">
+              <a:defRPr sz="1200"/>
+            </a:lvl1pPr>
+          </a:lstStyle>
+          <a:p>
+            <a:endParaRPr lang="en-US"/>
+          </a:p>
+        </p:txBody>
+      </p:sp>
+      <p:sp>
+        <p:nvSpPr>
+          <p:cNvPr id="3" name="Date Placeholder 2"/>
+          <p:cNvSpPr>
+            <a:spLocks noGrp="1"/>
+          </p:cNvSpPr>
+          <p:nvPr>
+            <p:ph type="dt" idx="1"/>
+          </p:nvPr>
+        </p:nvSpPr>
+        <p:spPr>
+          <a:xfrm>
+            <a:off x="3884613" y="0"/>
+            <a:ext cx="2971800" cy="457200"/>
+          </a:xfrm>
+          <a:prstGeom prst="rect">
+            <a:avLst/>
+          </a:prstGeom>
+        </p:spPr>
+        <p:txBody>
+          <a:bodyPr vert="horz" lIns="91440" tIns="45720" rIns="91440" bIns="45720" rtlCol="0"/>
+          <a:lstStyle>
+            <a:lvl1pPr algn="r">
+              <a:defRPr sz="1200"/>
+            </a:lvl1pPr>
+          </a:lstStyle>
+          <a:p>
+            <a:fld id="{1A7E5560-3CE3-8848-95FA-B46AAD8A6763}" type="datetimeFigureOut">
+              <a:rPr lang="en-US" smtClean="0"/>
+              <a:t>12/7/14</a:t>
+            </a:fld>
+            <a:endParaRPr lang="en-US"/>
+          </a:p>
+        </p:txBody>
+      </p:sp>
+      <p:sp>
+        <p:nvSpPr>
+          <p:cNvPr id="4" name="Slide Image Placeholder 3"/>
+          <p:cNvSpPr>
+            <a:spLocks noGrp="1" noRot="1" noChangeAspect="1"/>
+          </p:cNvSpPr>
+          <p:nvPr>
+            <p:ph type="sldImg" idx="2"/>
+          </p:nvPr>
+        </p:nvSpPr>
+        <p:spPr>
+          <a:xfrm>
+            <a:off x="1143000" y="685800"/>
+            <a:ext cx="4572000" cy="3429000"/>
+          </a:xfrm>
+          <a:prstGeom prst="rect">
+            <a:avLst/>
+          </a:prstGeom>
+          <a:noFill/>
+          <a:ln w="12700">
+            <a:solidFill>
+              <a:prstClr val="black"/>
+            </a:solidFill>
+          </a:ln>
+        </p:spPr>
+        <p:txBody>
+          <a:bodyPr vert="horz" lIns="91440" tIns="45720" rIns="91440" bIns="45720" rtlCol="0" anchor="ctr"/>
+          <a:lstStyle/>
+          <a:p>
+            <a:endParaRPr lang="en-US"/>
+          </a:p>
+        </p:txBody>
+      </p:sp>
+      <p:sp>
+        <p:nvSpPr>
+          <p:cNvPr id="5" name="Notes Placeholder 4"/>
+          <p:cNvSpPr>
+            <a:spLocks noGrp="1"/>
+          </p:cNvSpPr>
+          <p:nvPr>
+            <p:ph type="body" sz="quarter" idx="3"/>
+          </p:nvPr>
+        </p:nvSpPr>
+        <p:spPr>
+          <a:xfrm>
+            <a:off x="685800" y="4343400"/>
+            <a:ext cx="5486400" cy="4114800"/>
+          </a:xfrm>
+          <a:prstGeom prst="rect">
+            <a:avLst/>
+          </a:prstGeom>
+        </p:spPr>
+        <p:txBody>
+          <a:bodyPr vert="horz" lIns="91440" tIns="45720" rIns="91440" bIns="45720" rtlCol="0"/>
+          <a:lstStyle/>
+          <a:p>
+            <a:pPr lvl="0"/>
+            <a:r>
+              <a:rPr lang="en-US" smtClean="0"/>
+              <a:t>Click to edit Master text styles</a:t>
+            </a:r>
+          </a:p>
+          <a:p>
+            <a:pPr lvl="1"/>
+            <a:r>
+              <a:rPr lang="en-US" smtClean="0"/>
+              <a:t>Second level</a:t>
+            </a:r>
+          </a:p>
+          <a:p>
+            <a:pPr lvl="2"/>
+            <a:r>
+              <a:rPr lang="en-US" smtClean="0"/>
+              <a:t>Third level</a:t>
+            </a:r>
+          </a:p>
+          <a:p>
+            <a:pPr lvl="3"/>
+            <a:r>
+              <a:rPr lang="en-US" smtClean="0"/>
+              <a:t>Fourth level</a:t>
+            </a:r>
+          </a:p>
+          <a:p>
+            <a:pPr lvl="4"/>
+            <a:r>
+              <a:rPr lang="en-US" smtClean="0"/>
+              <a:t>Fifth level</a:t>
+            </a:r>
+            <a:endParaRPr lang="en-US"/>
+          </a:p>
+        </p:txBody>
+      </p:sp>
+      <p:sp>
+        <p:nvSpPr>
+          <p:cNvPr id="6" name="Footer Placeholder 5"/>
+          <p:cNvSpPr>
+            <a:spLocks noGrp="1"/>
+          </p:cNvSpPr>
+          <p:nvPr>
+            <p:ph type="ftr" sz="quarter" idx="4"/>
+          </p:nvPr>
+        </p:nvSpPr>
+        <p:spPr>
+          <a:xfrm>
+            <a:off x="0" y="8685213"/>
+            <a:ext cx="2971800" cy="457200"/>
+          </a:xfrm>
+          <a:prstGeom prst="rect">
+            <a:avLst/>
+          </a:prstGeom>
+        </p:spPr>
+        <p:txBody>
+          <a:bodyPr vert="horz" lIns="91440" tIns="45720" rIns="91440" bIns="45720" rtlCol="0" anchor="b"/>
+          <a:lstStyle>
+            <a:lvl1pPr algn="l">
+              <a:defRPr sz="1200"/>
+            </a:lvl1pPr>
+          </a:lstStyle>
+          <a:p>
+            <a:endParaRPr lang="en-US"/>
+          </a:p>
+        </p:txBody>
+      </p:sp>
+      <p:sp>
+        <p:nvSpPr>
+          <p:cNvPr id="7" name="Slide Number Placeholder 6"/>
+          <p:cNvSpPr>
+            <a:spLocks noGrp="1"/>
+          </p:cNvSpPr>
+          <p:nvPr>
+            <p:ph type="sldNum" sz="quarter" idx="5"/>
+          </p:nvPr>
+        </p:nvSpPr>
+        <p:spPr>
+          <a:xfrm>
+            <a:off x="3884613" y="8685213"/>
+            <a:ext cx="2971800" cy="457200"/>
+          </a:xfrm>
+          <a:prstGeom prst="rect">
+            <a:avLst/>
+          </a:prstGeom>
+        </p:spPr>
+        <p:txBody>
+          <a:bodyPr vert="horz" lIns="91440" tIns="45720" rIns="91440" bIns="45720" rtlCol="0" anchor="b"/>
+          <a:lstStyle>
+            <a:lvl1pPr algn="r">
+              <a:defRPr sz="1200"/>
+            </a:lvl1pPr>
+          </a:lstStyle>
+          <a:p>
+            <a:fld id="{5BB007AF-E97E-024E-A7BC-DEA84035D5F1}" type="slidenum">
+              <a:rPr lang="en-US" smtClean="0"/>
+              <a:t>‹#›</a:t>
+            </a:fld>
+            <a:endParaRPr lang="en-US"/>
+          </a:p>
+        </p:txBody>
+      </p:sp>
+    </p:spTree>
+    <p:extLst>
+      <p:ext uri="{BB962C8B-B14F-4D97-AF65-F5344CB8AC3E}">
+        <p14:creationId xmlns:p14="http://schemas.microsoft.com/office/powerpoint/2010/main" val="176065026"/>
+      </p:ext>
+    </p:extLst>
+  </p:cSld>
+  <p:clrMap bg1="lt1" tx1="dk1" bg2="lt2" tx2="dk2" accent1="accent1" accent2="accent2" accent3="accent3" accent4="accent4" accent5="accent5" accent6="accent6" hlink="hlink" folHlink="folHlink"/>
+  <p:notesStyle>
+    <a:lvl1pPr marL="0" algn="l" defTabSz="457200" rtl="0" eaLnBrk="1" latinLnBrk="0" hangingPunct="1">
+      <a:defRPr sz="1200" kern="1200">
+        <a:solidFill>
+          <a:schemeClr val="tx1"/>
+        </a:solidFill>
+        <a:latin typeface="+mn-lt"/>
+        <a:ea typeface="+mn-ea"/>
+        <a:cs typeface="+mn-cs"/>
+      </a:defRPr>
+    </a:lvl1pPr>
+    <a:lvl2pPr marL="457200" algn="l" defTabSz="457200" rtl="0" eaLnBrk="1" latinLnBrk="0" hangingPunct="1">
+      <a:defRPr sz="1200" kern="1200">
+        <a:solidFill>
+          <a:schemeClr val="tx1"/>
+        </a:solidFill>
+        <a:latin typeface="+mn-lt"/>
+        <a:ea typeface="+mn-ea"/>
+        <a:cs typeface="+mn-cs"/>
+      </a:defRPr>
+    </a:lvl2pPr>
+    <a:lvl3pPr marL="914400" algn="l" defTabSz="457200" rtl="0" eaLnBrk="1" latinLnBrk="0" hangingPunct="1">
+      <a:defRPr sz="1200" kern="1200">
+        <a:solidFill>
+          <a:schemeClr val="tx1"/>
+        </a:solidFill>
+        <a:latin typeface="+mn-lt"/>
+        <a:ea typeface="+mn-ea"/>
+        <a:cs typeface="+mn-cs"/>
+      </a:defRPr>
+    </a:lvl3pPr>
+    <a:lvl4pPr marL="1371600" algn="l" defTabSz="457200" rtl="0" eaLnBrk="1" latinLnBrk="0" hangingPunct="1">
+      <a:defRPr sz="1200" kern="1200">
+        <a:solidFill>
+          <a:schemeClr val="tx1"/>
+        </a:solidFill>
+        <a:latin typeface="+mn-lt"/>
+        <a:ea typeface="+mn-ea"/>
+        <a:cs typeface="+mn-cs"/>
+      </a:defRPr>
+    </a:lvl4pPr>
+    <a:lvl5pPr marL="1828800" algn="l" defTabSz="457200" rtl="0" eaLnBrk="1" latinLnBrk="0" hangingPunct="1">
+      <a:defRPr sz="1200" kern="1200">
+        <a:solidFill>
+          <a:schemeClr val="tx1"/>
+        </a:solidFill>
+        <a:latin typeface="+mn-lt"/>
+        <a:ea typeface="+mn-ea"/>
+        <a:cs typeface="+mn-cs"/>
+      </a:defRPr>
+    </a:lvl5pPr>
+    <a:lvl6pPr marL="2286000" algn="l" defTabSz="457200" rtl="0" eaLnBrk="1" latinLnBrk="0" hangingPunct="1">
+      <a:defRPr sz="1200" kern="1200">
+        <a:solidFill>
+          <a:schemeClr val="tx1"/>
+        </a:solidFill>
+        <a:latin typeface="+mn-lt"/>
+        <a:ea typeface="+mn-ea"/>
+        <a:cs typeface="+mn-cs"/>
+      </a:defRPr>
+    </a:lvl6pPr>
+    <a:lvl7pPr marL="2743200" algn="l" defTabSz="457200" rtl="0" eaLnBrk="1" latinLnBrk="0" hangingPunct="1">
+      <a:defRPr sz="1200" kern="1200">
+        <a:solidFill>
+          <a:schemeClr val="tx1"/>
+        </a:solidFill>
+        <a:latin typeface="+mn-lt"/>
+        <a:ea typeface="+mn-ea"/>
+        <a:cs typeface="+mn-cs"/>
+      </a:defRPr>
+    </a:lvl7pPr>
+    <a:lvl8pPr marL="3200400" algn="l" defTabSz="457200" rtl="0" eaLnBrk="1" latinLnBrk="0" hangingPunct="1">
+      <a:defRPr sz="1200" kern="1200">
+        <a:solidFill>
+          <a:schemeClr val="tx1"/>
+        </a:solidFill>
+        <a:latin typeface="+mn-lt"/>
+        <a:ea typeface="+mn-ea"/>
+        <a:cs typeface="+mn-cs"/>
+      </a:defRPr>
+    </a:lvl8pPr>
+    <a:lvl9pPr marL="3657600" algn="l" defTabSz="457200" rtl="0" eaLnBrk="1" latinLnBrk="0" hangingPunct="1">
+      <a:defRPr sz="1200" kern="1200">
+        <a:solidFill>
+          <a:schemeClr val="tx1"/>
+        </a:solidFill>
+        <a:latin typeface="+mn-lt"/>
+        <a:ea typeface="+mn-ea"/>
+        <a:cs typeface="+mn-cs"/>
+      </a:defRPr>
+    </a:lvl9pPr>
+  </p:notesStyle>
+</p:notesMaster>
+</file>
+
+<file path=ppt/notesSlides/notesSlide1.xml><?xml version="1.0" encoding="utf-8"?>
+<p:notes xmlns:a="http://schemas.openxmlformats.org/drawingml/2006/main" xmlns:r="http://schemas.openxmlformats.org/officeDocument/2006/relationships" xmlns:p="http://schemas.openxmlformats.org/presentationml/2006/main">
+  <p:cSld>
+    <p:spTree>
+      <p:nvGrpSpPr>
+        <p:cNvPr id="1" name=""/>
+        <p:cNvGrpSpPr/>
+        <p:nvPr/>
+      </p:nvGrpSpPr>
+      <p:grpSpPr>
+        <a:xfrm>
+          <a:off x="0" y="0"/>
+          <a:ext cx="0" cy="0"/>
+          <a:chOff x="0" y="0"/>
+          <a:chExt cx="0" cy="0"/>
+        </a:xfrm>
+      </p:grpSpPr>
+      <p:sp>
+        <p:nvSpPr>
+          <p:cNvPr id="2" name="Slide Image Placeholder 1"/>
+          <p:cNvSpPr>
+            <a:spLocks noGrp="1" noRot="1" noChangeAspect="1"/>
+          </p:cNvSpPr>
+          <p:nvPr>
+            <p:ph type="sldImg"/>
+          </p:nvPr>
+        </p:nvSpPr>
+        <p:spPr/>
+      </p:sp>
+      <p:sp>
+        <p:nvSpPr>
+          <p:cNvPr id="3" name="Notes Placeholder 2"/>
+          <p:cNvSpPr>
+            <a:spLocks noGrp="1"/>
+          </p:cNvSpPr>
+          <p:nvPr>
+            <p:ph type="body" idx="1"/>
+          </p:nvPr>
+        </p:nvSpPr>
+        <p:spPr/>
+        <p:txBody>
+          <a:bodyPr/>
+          <a:lstStyle/>
+          <a:p>
+            <a:r>
+              <a:rPr lang="en-US" dirty="0" err="1" smtClean="0"/>
+              <a:t>Trello</a:t>
+            </a:r>
+            <a:r>
+              <a:rPr lang="en-US" dirty="0" smtClean="0"/>
+              <a:t>:</a:t>
+            </a:r>
+            <a:r>
+              <a:rPr lang="en-US" baseline="0" dirty="0" smtClean="0"/>
+              <a:t> it did what it wanted but it wasn’t exactly what we would have wanted. Maybe it was just the way we used it but the stories needed to be smaller and we didn’t actually use it</a:t>
+            </a:r>
+          </a:p>
+          <a:p>
+            <a:r>
+              <a:rPr lang="en-US" baseline="0" dirty="0" err="1" smtClean="0"/>
+              <a:t>Git</a:t>
+            </a:r>
+            <a:r>
+              <a:rPr lang="en-US" baseline="0" dirty="0" smtClean="0"/>
+              <a:t>: would have been really useful to have notifications</a:t>
+            </a:r>
+            <a:endParaRPr lang="en-US" dirty="0"/>
+          </a:p>
+        </p:txBody>
+      </p:sp>
+      <p:sp>
+        <p:nvSpPr>
+          <p:cNvPr id="4" name="Slide Number Placeholder 3"/>
+          <p:cNvSpPr>
+            <a:spLocks noGrp="1"/>
+          </p:cNvSpPr>
+          <p:nvPr>
+            <p:ph type="sldNum" sz="quarter" idx="10"/>
+          </p:nvPr>
+        </p:nvSpPr>
+        <p:spPr/>
+        <p:txBody>
+          <a:bodyPr/>
+          <a:lstStyle/>
+          <a:p>
+            <a:fld id="{5BB007AF-E97E-024E-A7BC-DEA84035D5F1}" type="slidenum">
+              <a:rPr lang="en-US" smtClean="0"/>
+              <a:t>2</a:t>
+            </a:fld>
+            <a:endParaRPr lang="en-US"/>
+          </a:p>
+        </p:txBody>
+      </p:sp>
+    </p:spTree>
+    <p:extLst>
+      <p:ext uri="{BB962C8B-B14F-4D97-AF65-F5344CB8AC3E}">
+        <p14:creationId xmlns:p14="http://schemas.microsoft.com/office/powerpoint/2010/main" val="3814179705"/>
+      </p:ext>
+    </p:extLst>
+  </p:cSld>
+  <p:clrMapOvr>
+    <a:masterClrMapping/>
+  </p:clrMapOvr>
+</p:notes>
 </file>
 
 <file path=ppt/slideLayouts/slideLayout1.xml><?xml version="1.0" encoding="utf-8"?>
@@ -3762,14 +4223,19 @@
             <p:ph type="title"/>
           </p:nvPr>
         </p:nvSpPr>
-        <p:spPr/>
+        <p:spPr>
+          <a:xfrm>
+            <a:off x="3850823" y="107576"/>
+            <a:ext cx="4740727" cy="1336956"/>
+          </a:xfrm>
+        </p:spPr>
         <p:txBody>
           <a:bodyPr/>
           <a:lstStyle/>
           <a:p>
             <a:r>
               <a:rPr lang="en-US" dirty="0" smtClean="0"/>
-              <a:t>Tools and Methods</a:t>
+              <a:t>Tools</a:t>
             </a:r>
             <a:endParaRPr lang="en-US" dirty="0"/>
           </a:p>
@@ -3786,7 +4252,7 @@
           </p:nvPr>
         </p:nvPicPr>
         <p:blipFill>
-          <a:blip r:embed="rId2"/>
+          <a:blip r:embed="rId3"/>
           <a:srcRect t="22996" b="22996"/>
           <a:stretch>
             <a:fillRect/>
@@ -3794,8 +4260,8 @@
         </p:blipFill>
         <p:spPr>
           <a:xfrm>
-            <a:off x="549275" y="1600201"/>
-            <a:ext cx="2750986" cy="1485728"/>
+            <a:off x="549275" y="2346171"/>
+            <a:ext cx="2482225" cy="1340578"/>
           </a:xfrm>
         </p:spPr>
       </p:pic>
@@ -3808,7 +4274,7 @@
         <p:spPr>
           <a:xfrm>
             <a:off x="3850824" y="1747783"/>
-            <a:ext cx="4315108" cy="1200329"/>
+            <a:ext cx="3523094" cy="1477328"/>
           </a:xfrm>
           <a:prstGeom prst="rect">
             <a:avLst/>
@@ -3827,7 +4293,15 @@
             </a:pPr>
             <a:r>
               <a:rPr lang="en-US" dirty="0" smtClean="0"/>
-              <a:t>Project Tracker</a:t>
+              <a:t>Project Tracker: </a:t>
+            </a:r>
+            <a:r>
+              <a:rPr lang="en-US" dirty="0" err="1" smtClean="0"/>
+              <a:t>Trello</a:t>
+            </a:r>
+            <a:r>
+              <a:rPr lang="en-US" dirty="0" smtClean="0"/>
+              <a:t> </a:t>
             </a:r>
           </a:p>
           <a:p>
@@ -3837,7 +4311,23 @@
             </a:pPr>
             <a:r>
               <a:rPr lang="en-US" dirty="0" smtClean="0"/>
-              <a:t>VCS</a:t>
+              <a:t>VCS: </a:t>
+            </a:r>
+            <a:r>
+              <a:rPr lang="en-US" dirty="0" err="1" smtClean="0"/>
+              <a:t>git</a:t>
+            </a:r>
+            <a:r>
+              <a:rPr lang="en-US" dirty="0" smtClean="0"/>
+              <a:t> (</a:t>
+            </a:r>
+            <a:r>
+              <a:rPr lang="en-US" dirty="0" err="1" smtClean="0"/>
+              <a:t>github</a:t>
+            </a:r>
+            <a:r>
+              <a:rPr lang="en-US" dirty="0" smtClean="0"/>
+              <a:t>)</a:t>
             </a:r>
           </a:p>
           <a:p>
@@ -3847,7 +4337,7 @@
             </a:pPr>
             <a:r>
               <a:rPr lang="en-US" dirty="0" smtClean="0"/>
-              <a:t>Programming Environment</a:t>
+              <a:t>IDE: Eclipse</a:t>
             </a:r>
           </a:p>
           <a:p>
@@ -3857,39 +4347,34 @@
             </a:pPr>
             <a:r>
               <a:rPr lang="en-US" dirty="0" smtClean="0"/>
-              <a:t>Agile</a:t>
-            </a:r>
-            <a:endParaRPr lang="en-US" dirty="0"/>
+              <a:t>Database: </a:t>
+            </a:r>
+            <a:r>
+              <a:rPr lang="en-US" dirty="0" err="1" smtClean="0"/>
+              <a:t>PostgreSQL</a:t>
+            </a:r>
+            <a:endParaRPr lang="en-US" dirty="0" smtClean="0"/>
+          </a:p>
+          <a:p>
+            <a:pPr marL="285750" indent="-285750">
+              <a:buFont typeface="Arial"/>
+              <a:buChar char="•"/>
+            </a:pPr>
+            <a:r>
+              <a:rPr lang="en-US" dirty="0" smtClean="0"/>
+              <a:t>Documentation: </a:t>
+            </a:r>
+            <a:r>
+              <a:rPr lang="en-US" dirty="0" err="1" smtClean="0"/>
+              <a:t>Javadoc</a:t>
+            </a:r>
+            <a:endParaRPr lang="en-US" dirty="0" smtClean="0"/>
           </a:p>
         </p:txBody>
       </p:sp>
       <p:pic>
         <p:nvPicPr>
           <p:cNvPr id="6" name="Picture 5"/>
-          <p:cNvPicPr>
-            <a:picLocks noChangeAspect="1"/>
-          </p:cNvPicPr>
-          <p:nvPr/>
-        </p:nvPicPr>
-        <p:blipFill>
-          <a:blip r:embed="rId3"/>
-          <a:stretch>
-            <a:fillRect/>
-          </a:stretch>
-        </p:blipFill>
-        <p:spPr>
-          <a:xfrm>
-            <a:off x="549275" y="3318056"/>
-            <a:ext cx="3362143" cy="3362143"/>
-          </a:xfrm>
-          <a:prstGeom prst="rect">
-            <a:avLst/>
-          </a:prstGeom>
-        </p:spPr>
-      </p:pic>
-      <p:pic>
-        <p:nvPicPr>
-          <p:cNvPr id="7" name="Picture 6"/>
           <p:cNvPicPr>
             <a:picLocks noChangeAspect="1"/>
           </p:cNvPicPr>
@@ -3903,8 +4388,1087 @@
         </p:blipFill>
         <p:spPr>
           <a:xfrm>
-            <a:off x="3911418" y="4053482"/>
-            <a:ext cx="2476030" cy="2476030"/>
+            <a:off x="494655" y="3835029"/>
+            <a:ext cx="2626717" cy="2626717"/>
+          </a:xfrm>
+          <a:prstGeom prst="rect">
+            <a:avLst/>
+          </a:prstGeom>
+        </p:spPr>
+      </p:pic>
+      <p:pic>
+        <p:nvPicPr>
+          <p:cNvPr id="7" name="Picture 6"/>
+          <p:cNvPicPr>
+            <a:picLocks noChangeAspect="1"/>
+          </p:cNvPicPr>
+          <p:nvPr/>
+        </p:nvPicPr>
+        <p:blipFill>
+          <a:blip r:embed="rId5"/>
+          <a:stretch>
+            <a:fillRect/>
+          </a:stretch>
+        </p:blipFill>
+        <p:spPr>
+          <a:xfrm>
+            <a:off x="3447134" y="4123687"/>
+            <a:ext cx="2078614" cy="2078614"/>
+          </a:xfrm>
+          <a:prstGeom prst="rect">
+            <a:avLst/>
+          </a:prstGeom>
+        </p:spPr>
+      </p:pic>
+      <p:sp>
+        <p:nvSpPr>
+          <p:cNvPr id="8" name="5-Point Star 7"/>
+          <p:cNvSpPr/>
+          <p:nvPr/>
+        </p:nvSpPr>
+        <p:spPr>
+          <a:xfrm>
+            <a:off x="7446572" y="1824821"/>
+            <a:ext cx="232142" cy="232142"/>
+          </a:xfrm>
+          <a:prstGeom prst="star5">
+            <a:avLst/>
+          </a:prstGeom>
+          <a:solidFill>
+            <a:schemeClr val="accent4"/>
+          </a:solidFill>
+        </p:spPr>
+        <p:style>
+          <a:lnRef idx="1">
+            <a:schemeClr val="accent1"/>
+          </a:lnRef>
+          <a:fillRef idx="3">
+            <a:schemeClr val="accent1"/>
+          </a:fillRef>
+          <a:effectRef idx="2">
+            <a:schemeClr val="accent1"/>
+          </a:effectRef>
+          <a:fontRef idx="minor">
+            <a:schemeClr val="lt1"/>
+          </a:fontRef>
+        </p:style>
+        <p:txBody>
+          <a:bodyPr rtlCol="0" anchor="ctr"/>
+          <a:lstStyle/>
+          <a:p>
+            <a:pPr algn="ctr"/>
+            <a:endParaRPr lang="en-US"/>
+          </a:p>
+        </p:txBody>
+      </p:sp>
+      <p:sp>
+        <p:nvSpPr>
+          <p:cNvPr id="9" name="5-Point Star 8"/>
+          <p:cNvSpPr/>
+          <p:nvPr/>
+        </p:nvSpPr>
+        <p:spPr>
+          <a:xfrm>
+            <a:off x="7680902" y="1827016"/>
+            <a:ext cx="232142" cy="232142"/>
+          </a:xfrm>
+          <a:prstGeom prst="star5">
+            <a:avLst/>
+          </a:prstGeom>
+          <a:solidFill>
+            <a:srgbClr val="FFB400"/>
+          </a:solidFill>
+        </p:spPr>
+        <p:style>
+          <a:lnRef idx="1">
+            <a:schemeClr val="accent1"/>
+          </a:lnRef>
+          <a:fillRef idx="3">
+            <a:schemeClr val="accent1"/>
+          </a:fillRef>
+          <a:effectRef idx="2">
+            <a:schemeClr val="accent1"/>
+          </a:effectRef>
+          <a:fontRef idx="minor">
+            <a:schemeClr val="lt1"/>
+          </a:fontRef>
+        </p:style>
+        <p:txBody>
+          <a:bodyPr rtlCol="0" anchor="ctr"/>
+          <a:lstStyle/>
+          <a:p>
+            <a:pPr algn="ctr"/>
+            <a:endParaRPr lang="en-US"/>
+          </a:p>
+        </p:txBody>
+      </p:sp>
+      <p:sp>
+        <p:nvSpPr>
+          <p:cNvPr id="11" name="5-Point Star 10"/>
+          <p:cNvSpPr/>
+          <p:nvPr/>
+        </p:nvSpPr>
+        <p:spPr>
+          <a:xfrm>
+            <a:off x="8149562" y="1831406"/>
+            <a:ext cx="232142" cy="232142"/>
+          </a:xfrm>
+          <a:prstGeom prst="star5">
+            <a:avLst/>
+          </a:prstGeom>
+        </p:spPr>
+        <p:style>
+          <a:lnRef idx="1">
+            <a:schemeClr val="accent1"/>
+          </a:lnRef>
+          <a:fillRef idx="3">
+            <a:schemeClr val="accent1"/>
+          </a:fillRef>
+          <a:effectRef idx="2">
+            <a:schemeClr val="accent1"/>
+          </a:effectRef>
+          <a:fontRef idx="minor">
+            <a:schemeClr val="lt1"/>
+          </a:fontRef>
+        </p:style>
+        <p:txBody>
+          <a:bodyPr rtlCol="0" anchor="ctr"/>
+          <a:lstStyle/>
+          <a:p>
+            <a:pPr algn="ctr"/>
+            <a:endParaRPr lang="en-US"/>
+          </a:p>
+        </p:txBody>
+      </p:sp>
+      <p:sp>
+        <p:nvSpPr>
+          <p:cNvPr id="12" name="5-Point Star 11"/>
+          <p:cNvSpPr/>
+          <p:nvPr/>
+        </p:nvSpPr>
+        <p:spPr>
+          <a:xfrm>
+            <a:off x="8383892" y="1833601"/>
+            <a:ext cx="232142" cy="232142"/>
+          </a:xfrm>
+          <a:prstGeom prst="star5">
+            <a:avLst/>
+          </a:prstGeom>
+        </p:spPr>
+        <p:style>
+          <a:lnRef idx="1">
+            <a:schemeClr val="accent1"/>
+          </a:lnRef>
+          <a:fillRef idx="3">
+            <a:schemeClr val="accent1"/>
+          </a:fillRef>
+          <a:effectRef idx="2">
+            <a:schemeClr val="accent1"/>
+          </a:effectRef>
+          <a:fontRef idx="minor">
+            <a:schemeClr val="lt1"/>
+          </a:fontRef>
+        </p:style>
+        <p:txBody>
+          <a:bodyPr rtlCol="0" anchor="ctr"/>
+          <a:lstStyle/>
+          <a:p>
+            <a:pPr algn="ctr"/>
+            <a:endParaRPr lang="en-US"/>
+          </a:p>
+        </p:txBody>
+      </p:sp>
+      <p:sp>
+        <p:nvSpPr>
+          <p:cNvPr id="13" name="5-Point Star 12"/>
+          <p:cNvSpPr/>
+          <p:nvPr/>
+        </p:nvSpPr>
+        <p:spPr>
+          <a:xfrm>
+            <a:off x="7448767" y="2100116"/>
+            <a:ext cx="232142" cy="232142"/>
+          </a:xfrm>
+          <a:prstGeom prst="star5">
+            <a:avLst/>
+          </a:prstGeom>
+          <a:solidFill>
+            <a:srgbClr val="FFB400"/>
+          </a:solidFill>
+        </p:spPr>
+        <p:style>
+          <a:lnRef idx="1">
+            <a:schemeClr val="accent1"/>
+          </a:lnRef>
+          <a:fillRef idx="3">
+            <a:schemeClr val="accent1"/>
+          </a:fillRef>
+          <a:effectRef idx="2">
+            <a:schemeClr val="accent1"/>
+          </a:effectRef>
+          <a:fontRef idx="minor">
+            <a:schemeClr val="lt1"/>
+          </a:fontRef>
+        </p:style>
+        <p:txBody>
+          <a:bodyPr rtlCol="0" anchor="ctr"/>
+          <a:lstStyle/>
+          <a:p>
+            <a:pPr algn="ctr"/>
+            <a:endParaRPr lang="en-US"/>
+          </a:p>
+        </p:txBody>
+      </p:sp>
+      <p:sp>
+        <p:nvSpPr>
+          <p:cNvPr id="14" name="5-Point Star 13"/>
+          <p:cNvSpPr/>
+          <p:nvPr/>
+        </p:nvSpPr>
+        <p:spPr>
+          <a:xfrm>
+            <a:off x="7683097" y="2102311"/>
+            <a:ext cx="232142" cy="232142"/>
+          </a:xfrm>
+          <a:prstGeom prst="star5">
+            <a:avLst/>
+          </a:prstGeom>
+          <a:solidFill>
+            <a:srgbClr val="FFB400"/>
+          </a:solidFill>
+        </p:spPr>
+        <p:style>
+          <a:lnRef idx="1">
+            <a:schemeClr val="accent1"/>
+          </a:lnRef>
+          <a:fillRef idx="3">
+            <a:schemeClr val="accent1"/>
+          </a:fillRef>
+          <a:effectRef idx="2">
+            <a:schemeClr val="accent1"/>
+          </a:effectRef>
+          <a:fontRef idx="minor">
+            <a:schemeClr val="lt1"/>
+          </a:fontRef>
+        </p:style>
+        <p:txBody>
+          <a:bodyPr rtlCol="0" anchor="ctr"/>
+          <a:lstStyle/>
+          <a:p>
+            <a:pPr algn="ctr"/>
+            <a:endParaRPr lang="en-US"/>
+          </a:p>
+        </p:txBody>
+      </p:sp>
+      <p:sp>
+        <p:nvSpPr>
+          <p:cNvPr id="15" name="5-Point Star 14"/>
+          <p:cNvSpPr/>
+          <p:nvPr/>
+        </p:nvSpPr>
+        <p:spPr>
+          <a:xfrm>
+            <a:off x="7917427" y="2104506"/>
+            <a:ext cx="232142" cy="232142"/>
+          </a:xfrm>
+          <a:prstGeom prst="star5">
+            <a:avLst/>
+          </a:prstGeom>
+          <a:solidFill>
+            <a:srgbClr val="FFB400"/>
+          </a:solidFill>
+        </p:spPr>
+        <p:style>
+          <a:lnRef idx="1">
+            <a:schemeClr val="accent1"/>
+          </a:lnRef>
+          <a:fillRef idx="3">
+            <a:schemeClr val="accent1"/>
+          </a:fillRef>
+          <a:effectRef idx="2">
+            <a:schemeClr val="accent1"/>
+          </a:effectRef>
+          <a:fontRef idx="minor">
+            <a:schemeClr val="lt1"/>
+          </a:fontRef>
+        </p:style>
+        <p:txBody>
+          <a:bodyPr rtlCol="0" anchor="ctr"/>
+          <a:lstStyle/>
+          <a:p>
+            <a:pPr algn="ctr"/>
+            <a:endParaRPr lang="en-US"/>
+          </a:p>
+        </p:txBody>
+      </p:sp>
+      <p:sp>
+        <p:nvSpPr>
+          <p:cNvPr id="16" name="5-Point Star 15"/>
+          <p:cNvSpPr/>
+          <p:nvPr/>
+        </p:nvSpPr>
+        <p:spPr>
+          <a:xfrm>
+            <a:off x="8151757" y="2106701"/>
+            <a:ext cx="232142" cy="232142"/>
+          </a:xfrm>
+          <a:prstGeom prst="star5">
+            <a:avLst/>
+          </a:prstGeom>
+          <a:solidFill>
+            <a:srgbClr val="FFB400"/>
+          </a:solidFill>
+        </p:spPr>
+        <p:style>
+          <a:lnRef idx="1">
+            <a:schemeClr val="accent1"/>
+          </a:lnRef>
+          <a:fillRef idx="3">
+            <a:schemeClr val="accent1"/>
+          </a:fillRef>
+          <a:effectRef idx="2">
+            <a:schemeClr val="accent1"/>
+          </a:effectRef>
+          <a:fontRef idx="minor">
+            <a:schemeClr val="lt1"/>
+          </a:fontRef>
+        </p:style>
+        <p:txBody>
+          <a:bodyPr rtlCol="0" anchor="ctr"/>
+          <a:lstStyle/>
+          <a:p>
+            <a:pPr algn="ctr"/>
+            <a:endParaRPr lang="en-US"/>
+          </a:p>
+        </p:txBody>
+      </p:sp>
+      <p:sp>
+        <p:nvSpPr>
+          <p:cNvPr id="17" name="5-Point Star 16"/>
+          <p:cNvSpPr/>
+          <p:nvPr/>
+        </p:nvSpPr>
+        <p:spPr>
+          <a:xfrm>
+            <a:off x="8386087" y="2108896"/>
+            <a:ext cx="232142" cy="232142"/>
+          </a:xfrm>
+          <a:prstGeom prst="star5">
+            <a:avLst/>
+          </a:prstGeom>
+        </p:spPr>
+        <p:style>
+          <a:lnRef idx="1">
+            <a:schemeClr val="accent1"/>
+          </a:lnRef>
+          <a:fillRef idx="3">
+            <a:schemeClr val="accent1"/>
+          </a:fillRef>
+          <a:effectRef idx="2">
+            <a:schemeClr val="accent1"/>
+          </a:effectRef>
+          <a:fontRef idx="minor">
+            <a:schemeClr val="lt1"/>
+          </a:fontRef>
+        </p:style>
+        <p:txBody>
+          <a:bodyPr rtlCol="0" anchor="ctr"/>
+          <a:lstStyle/>
+          <a:p>
+            <a:pPr algn="ctr"/>
+            <a:endParaRPr lang="en-US"/>
+          </a:p>
+        </p:txBody>
+      </p:sp>
+      <p:sp>
+        <p:nvSpPr>
+          <p:cNvPr id="18" name="5-Point Star 17"/>
+          <p:cNvSpPr/>
+          <p:nvPr/>
+        </p:nvSpPr>
+        <p:spPr>
+          <a:xfrm>
+            <a:off x="7450962" y="2375411"/>
+            <a:ext cx="232142" cy="232142"/>
+          </a:xfrm>
+          <a:prstGeom prst="star5">
+            <a:avLst/>
+          </a:prstGeom>
+          <a:solidFill>
+            <a:srgbClr val="FFB400"/>
+          </a:solidFill>
+        </p:spPr>
+        <p:style>
+          <a:lnRef idx="1">
+            <a:schemeClr val="accent1"/>
+          </a:lnRef>
+          <a:fillRef idx="3">
+            <a:schemeClr val="accent1"/>
+          </a:fillRef>
+          <a:effectRef idx="2">
+            <a:schemeClr val="accent1"/>
+          </a:effectRef>
+          <a:fontRef idx="minor">
+            <a:schemeClr val="lt1"/>
+          </a:fontRef>
+        </p:style>
+        <p:txBody>
+          <a:bodyPr rtlCol="0" anchor="ctr"/>
+          <a:lstStyle/>
+          <a:p>
+            <a:pPr algn="ctr"/>
+            <a:endParaRPr lang="en-US"/>
+          </a:p>
+        </p:txBody>
+      </p:sp>
+      <p:sp>
+        <p:nvSpPr>
+          <p:cNvPr id="19" name="5-Point Star 18"/>
+          <p:cNvSpPr/>
+          <p:nvPr/>
+        </p:nvSpPr>
+        <p:spPr>
+          <a:xfrm>
+            <a:off x="7685292" y="2377606"/>
+            <a:ext cx="232142" cy="232142"/>
+          </a:xfrm>
+          <a:prstGeom prst="star5">
+            <a:avLst/>
+          </a:prstGeom>
+          <a:solidFill>
+            <a:srgbClr val="FFB400"/>
+          </a:solidFill>
+        </p:spPr>
+        <p:style>
+          <a:lnRef idx="1">
+            <a:schemeClr val="accent1"/>
+          </a:lnRef>
+          <a:fillRef idx="3">
+            <a:schemeClr val="accent1"/>
+          </a:fillRef>
+          <a:effectRef idx="2">
+            <a:schemeClr val="accent1"/>
+          </a:effectRef>
+          <a:fontRef idx="minor">
+            <a:schemeClr val="lt1"/>
+          </a:fontRef>
+        </p:style>
+        <p:txBody>
+          <a:bodyPr rtlCol="0" anchor="ctr"/>
+          <a:lstStyle/>
+          <a:p>
+            <a:pPr algn="ctr"/>
+            <a:endParaRPr lang="en-US"/>
+          </a:p>
+        </p:txBody>
+      </p:sp>
+      <p:sp>
+        <p:nvSpPr>
+          <p:cNvPr id="20" name="5-Point Star 19"/>
+          <p:cNvSpPr/>
+          <p:nvPr/>
+        </p:nvSpPr>
+        <p:spPr>
+          <a:xfrm>
+            <a:off x="7919622" y="2379801"/>
+            <a:ext cx="232142" cy="232142"/>
+          </a:xfrm>
+          <a:prstGeom prst="star5">
+            <a:avLst/>
+          </a:prstGeom>
+          <a:solidFill>
+            <a:srgbClr val="FFB400"/>
+          </a:solidFill>
+        </p:spPr>
+        <p:style>
+          <a:lnRef idx="1">
+            <a:schemeClr val="accent1"/>
+          </a:lnRef>
+          <a:fillRef idx="3">
+            <a:schemeClr val="accent1"/>
+          </a:fillRef>
+          <a:effectRef idx="2">
+            <a:schemeClr val="accent1"/>
+          </a:effectRef>
+          <a:fontRef idx="minor">
+            <a:schemeClr val="lt1"/>
+          </a:fontRef>
+        </p:style>
+        <p:txBody>
+          <a:bodyPr rtlCol="0" anchor="ctr"/>
+          <a:lstStyle/>
+          <a:p>
+            <a:pPr algn="ctr"/>
+            <a:endParaRPr lang="en-US"/>
+          </a:p>
+        </p:txBody>
+      </p:sp>
+      <p:sp>
+        <p:nvSpPr>
+          <p:cNvPr id="21" name="5-Point Star 20"/>
+          <p:cNvSpPr/>
+          <p:nvPr/>
+        </p:nvSpPr>
+        <p:spPr>
+          <a:xfrm>
+            <a:off x="8153952" y="2381996"/>
+            <a:ext cx="232142" cy="232142"/>
+          </a:xfrm>
+          <a:prstGeom prst="star5">
+            <a:avLst/>
+          </a:prstGeom>
+          <a:solidFill>
+            <a:srgbClr val="FFB400"/>
+          </a:solidFill>
+        </p:spPr>
+        <p:style>
+          <a:lnRef idx="1">
+            <a:schemeClr val="accent1"/>
+          </a:lnRef>
+          <a:fillRef idx="3">
+            <a:schemeClr val="accent1"/>
+          </a:fillRef>
+          <a:effectRef idx="2">
+            <a:schemeClr val="accent1"/>
+          </a:effectRef>
+          <a:fontRef idx="minor">
+            <a:schemeClr val="lt1"/>
+          </a:fontRef>
+        </p:style>
+        <p:txBody>
+          <a:bodyPr rtlCol="0" anchor="ctr"/>
+          <a:lstStyle/>
+          <a:p>
+            <a:pPr algn="ctr"/>
+            <a:endParaRPr lang="en-US"/>
+          </a:p>
+        </p:txBody>
+      </p:sp>
+      <p:sp>
+        <p:nvSpPr>
+          <p:cNvPr id="22" name="5-Point Star 21"/>
+          <p:cNvSpPr/>
+          <p:nvPr/>
+        </p:nvSpPr>
+        <p:spPr>
+          <a:xfrm>
+            <a:off x="8388282" y="2384191"/>
+            <a:ext cx="232142" cy="232142"/>
+          </a:xfrm>
+          <a:prstGeom prst="star5">
+            <a:avLst/>
+          </a:prstGeom>
+          <a:solidFill>
+            <a:srgbClr val="FFB400"/>
+          </a:solidFill>
+        </p:spPr>
+        <p:style>
+          <a:lnRef idx="1">
+            <a:schemeClr val="accent1"/>
+          </a:lnRef>
+          <a:fillRef idx="3">
+            <a:schemeClr val="accent1"/>
+          </a:fillRef>
+          <a:effectRef idx="2">
+            <a:schemeClr val="accent1"/>
+          </a:effectRef>
+          <a:fontRef idx="minor">
+            <a:schemeClr val="lt1"/>
+          </a:fontRef>
+        </p:style>
+        <p:txBody>
+          <a:bodyPr rtlCol="0" anchor="ctr"/>
+          <a:lstStyle/>
+          <a:p>
+            <a:pPr algn="ctr"/>
+            <a:endParaRPr lang="en-US"/>
+          </a:p>
+        </p:txBody>
+      </p:sp>
+      <p:sp>
+        <p:nvSpPr>
+          <p:cNvPr id="23" name="5-Point Star 22"/>
+          <p:cNvSpPr/>
+          <p:nvPr/>
+        </p:nvSpPr>
+        <p:spPr>
+          <a:xfrm>
+            <a:off x="7453157" y="2637051"/>
+            <a:ext cx="232142" cy="232142"/>
+          </a:xfrm>
+          <a:prstGeom prst="star5">
+            <a:avLst/>
+          </a:prstGeom>
+          <a:solidFill>
+            <a:srgbClr val="FFB400"/>
+          </a:solidFill>
+        </p:spPr>
+        <p:style>
+          <a:lnRef idx="1">
+            <a:schemeClr val="accent1"/>
+          </a:lnRef>
+          <a:fillRef idx="3">
+            <a:schemeClr val="accent1"/>
+          </a:fillRef>
+          <a:effectRef idx="2">
+            <a:schemeClr val="accent1"/>
+          </a:effectRef>
+          <a:fontRef idx="minor">
+            <a:schemeClr val="lt1"/>
+          </a:fontRef>
+        </p:style>
+        <p:txBody>
+          <a:bodyPr rtlCol="0" anchor="ctr"/>
+          <a:lstStyle/>
+          <a:p>
+            <a:pPr algn="ctr"/>
+            <a:endParaRPr lang="en-US"/>
+          </a:p>
+        </p:txBody>
+      </p:sp>
+      <p:sp>
+        <p:nvSpPr>
+          <p:cNvPr id="24" name="5-Point Star 23"/>
+          <p:cNvSpPr/>
+          <p:nvPr/>
+        </p:nvSpPr>
+        <p:spPr>
+          <a:xfrm>
+            <a:off x="7687487" y="2639246"/>
+            <a:ext cx="232142" cy="232142"/>
+          </a:xfrm>
+          <a:prstGeom prst="star5">
+            <a:avLst/>
+          </a:prstGeom>
+          <a:solidFill>
+            <a:srgbClr val="FFB400"/>
+          </a:solidFill>
+        </p:spPr>
+        <p:style>
+          <a:lnRef idx="1">
+            <a:schemeClr val="accent1"/>
+          </a:lnRef>
+          <a:fillRef idx="3">
+            <a:schemeClr val="accent1"/>
+          </a:fillRef>
+          <a:effectRef idx="2">
+            <a:schemeClr val="accent1"/>
+          </a:effectRef>
+          <a:fontRef idx="minor">
+            <a:schemeClr val="lt1"/>
+          </a:fontRef>
+        </p:style>
+        <p:txBody>
+          <a:bodyPr rtlCol="0" anchor="ctr"/>
+          <a:lstStyle/>
+          <a:p>
+            <a:pPr algn="ctr"/>
+            <a:endParaRPr lang="en-US"/>
+          </a:p>
+        </p:txBody>
+      </p:sp>
+      <p:sp>
+        <p:nvSpPr>
+          <p:cNvPr id="25" name="5-Point Star 24"/>
+          <p:cNvSpPr/>
+          <p:nvPr/>
+        </p:nvSpPr>
+        <p:spPr>
+          <a:xfrm>
+            <a:off x="7921817" y="2641441"/>
+            <a:ext cx="232142" cy="232142"/>
+          </a:xfrm>
+          <a:prstGeom prst="star5">
+            <a:avLst/>
+          </a:prstGeom>
+          <a:solidFill>
+            <a:srgbClr val="FFB400"/>
+          </a:solidFill>
+        </p:spPr>
+        <p:style>
+          <a:lnRef idx="1">
+            <a:schemeClr val="accent1"/>
+          </a:lnRef>
+          <a:fillRef idx="3">
+            <a:schemeClr val="accent1"/>
+          </a:fillRef>
+          <a:effectRef idx="2">
+            <a:schemeClr val="accent1"/>
+          </a:effectRef>
+          <a:fontRef idx="minor">
+            <a:schemeClr val="lt1"/>
+          </a:fontRef>
+        </p:style>
+        <p:txBody>
+          <a:bodyPr rtlCol="0" anchor="ctr"/>
+          <a:lstStyle/>
+          <a:p>
+            <a:pPr algn="ctr"/>
+            <a:endParaRPr lang="en-US"/>
+          </a:p>
+        </p:txBody>
+      </p:sp>
+      <p:sp>
+        <p:nvSpPr>
+          <p:cNvPr id="26" name="5-Point Star 25"/>
+          <p:cNvSpPr/>
+          <p:nvPr/>
+        </p:nvSpPr>
+        <p:spPr>
+          <a:xfrm>
+            <a:off x="8156147" y="2643636"/>
+            <a:ext cx="232142" cy="232142"/>
+          </a:xfrm>
+          <a:prstGeom prst="star5">
+            <a:avLst/>
+          </a:prstGeom>
+          <a:solidFill>
+            <a:srgbClr val="FFB400"/>
+          </a:solidFill>
+        </p:spPr>
+        <p:style>
+          <a:lnRef idx="1">
+            <a:schemeClr val="accent1"/>
+          </a:lnRef>
+          <a:fillRef idx="3">
+            <a:schemeClr val="accent1"/>
+          </a:fillRef>
+          <a:effectRef idx="2">
+            <a:schemeClr val="accent1"/>
+          </a:effectRef>
+          <a:fontRef idx="minor">
+            <a:schemeClr val="lt1"/>
+          </a:fontRef>
+        </p:style>
+        <p:txBody>
+          <a:bodyPr rtlCol="0" anchor="ctr"/>
+          <a:lstStyle/>
+          <a:p>
+            <a:pPr algn="ctr"/>
+            <a:endParaRPr lang="en-US"/>
+          </a:p>
+        </p:txBody>
+      </p:sp>
+      <p:sp>
+        <p:nvSpPr>
+          <p:cNvPr id="27" name="5-Point Star 26"/>
+          <p:cNvSpPr/>
+          <p:nvPr/>
+        </p:nvSpPr>
+        <p:spPr>
+          <a:xfrm>
+            <a:off x="8390477" y="2645831"/>
+            <a:ext cx="232142" cy="232142"/>
+          </a:xfrm>
+          <a:prstGeom prst="star5">
+            <a:avLst/>
+          </a:prstGeom>
+          <a:solidFill>
+            <a:srgbClr val="FFB400"/>
+          </a:solidFill>
+        </p:spPr>
+        <p:style>
+          <a:lnRef idx="1">
+            <a:schemeClr val="accent1"/>
+          </a:lnRef>
+          <a:fillRef idx="3">
+            <a:schemeClr val="accent1"/>
+          </a:fillRef>
+          <a:effectRef idx="2">
+            <a:schemeClr val="accent1"/>
+          </a:effectRef>
+          <a:fontRef idx="minor">
+            <a:schemeClr val="lt1"/>
+          </a:fontRef>
+        </p:style>
+        <p:txBody>
+          <a:bodyPr rtlCol="0" anchor="ctr"/>
+          <a:lstStyle/>
+          <a:p>
+            <a:pPr algn="ctr"/>
+            <a:endParaRPr lang="en-US"/>
+          </a:p>
+        </p:txBody>
+      </p:sp>
+      <p:pic>
+        <p:nvPicPr>
+          <p:cNvPr id="28" name="Picture 27"/>
+          <p:cNvPicPr>
+            <a:picLocks noChangeAspect="1"/>
+          </p:cNvPicPr>
+          <p:nvPr/>
+        </p:nvPicPr>
+        <p:blipFill>
+          <a:blip r:embed="rId6"/>
+          <a:stretch>
+            <a:fillRect/>
+          </a:stretch>
+        </p:blipFill>
+        <p:spPr>
+          <a:xfrm>
+            <a:off x="5786838" y="3946180"/>
+            <a:ext cx="3073711" cy="2434379"/>
+          </a:xfrm>
+          <a:prstGeom prst="rect">
+            <a:avLst/>
+          </a:prstGeom>
+        </p:spPr>
+      </p:pic>
+      <p:sp>
+        <p:nvSpPr>
+          <p:cNvPr id="29" name="5-Point Star 28"/>
+          <p:cNvSpPr/>
+          <p:nvPr/>
+        </p:nvSpPr>
+        <p:spPr>
+          <a:xfrm>
+            <a:off x="7933277" y="1833601"/>
+            <a:ext cx="232142" cy="232142"/>
+          </a:xfrm>
+          <a:prstGeom prst="star5">
+            <a:avLst/>
+          </a:prstGeom>
+        </p:spPr>
+        <p:style>
+          <a:lnRef idx="1">
+            <a:schemeClr val="accent1"/>
+          </a:lnRef>
+          <a:fillRef idx="3">
+            <a:schemeClr val="accent1"/>
+          </a:fillRef>
+          <a:effectRef idx="2">
+            <a:schemeClr val="accent1"/>
+          </a:effectRef>
+          <a:fontRef idx="minor">
+            <a:schemeClr val="lt1"/>
+          </a:fontRef>
+        </p:style>
+        <p:txBody>
+          <a:bodyPr rtlCol="0" anchor="ctr"/>
+          <a:lstStyle/>
+          <a:p>
+            <a:pPr algn="ctr"/>
+            <a:endParaRPr lang="en-US"/>
+          </a:p>
+        </p:txBody>
+      </p:sp>
+      <p:sp>
+        <p:nvSpPr>
+          <p:cNvPr id="31" name="5-Point Star 30"/>
+          <p:cNvSpPr/>
+          <p:nvPr/>
+        </p:nvSpPr>
+        <p:spPr>
+          <a:xfrm>
+            <a:off x="7453157" y="2896496"/>
+            <a:ext cx="232142" cy="232142"/>
+          </a:xfrm>
+          <a:prstGeom prst="star5">
+            <a:avLst/>
+          </a:prstGeom>
+          <a:solidFill>
+            <a:srgbClr val="FFB400"/>
+          </a:solidFill>
+        </p:spPr>
+        <p:style>
+          <a:lnRef idx="1">
+            <a:schemeClr val="accent1"/>
+          </a:lnRef>
+          <a:fillRef idx="3">
+            <a:schemeClr val="accent1"/>
+          </a:fillRef>
+          <a:effectRef idx="2">
+            <a:schemeClr val="accent1"/>
+          </a:effectRef>
+          <a:fontRef idx="minor">
+            <a:schemeClr val="lt1"/>
+          </a:fontRef>
+        </p:style>
+        <p:txBody>
+          <a:bodyPr rtlCol="0" anchor="ctr"/>
+          <a:lstStyle/>
+          <a:p>
+            <a:pPr algn="ctr"/>
+            <a:endParaRPr lang="en-US"/>
+          </a:p>
+        </p:txBody>
+      </p:sp>
+      <p:sp>
+        <p:nvSpPr>
+          <p:cNvPr id="32" name="5-Point Star 31"/>
+          <p:cNvSpPr/>
+          <p:nvPr/>
+        </p:nvSpPr>
+        <p:spPr>
+          <a:xfrm>
+            <a:off x="7687487" y="2898691"/>
+            <a:ext cx="232142" cy="232142"/>
+          </a:xfrm>
+          <a:prstGeom prst="star5">
+            <a:avLst/>
+          </a:prstGeom>
+          <a:solidFill>
+            <a:srgbClr val="FFB400"/>
+          </a:solidFill>
+        </p:spPr>
+        <p:style>
+          <a:lnRef idx="1">
+            <a:schemeClr val="accent1"/>
+          </a:lnRef>
+          <a:fillRef idx="3">
+            <a:schemeClr val="accent1"/>
+          </a:fillRef>
+          <a:effectRef idx="2">
+            <a:schemeClr val="accent1"/>
+          </a:effectRef>
+          <a:fontRef idx="minor">
+            <a:schemeClr val="lt1"/>
+          </a:fontRef>
+        </p:style>
+        <p:txBody>
+          <a:bodyPr rtlCol="0" anchor="ctr"/>
+          <a:lstStyle/>
+          <a:p>
+            <a:pPr algn="ctr"/>
+            <a:endParaRPr lang="en-US"/>
+          </a:p>
+        </p:txBody>
+      </p:sp>
+      <p:sp>
+        <p:nvSpPr>
+          <p:cNvPr id="33" name="5-Point Star 32"/>
+          <p:cNvSpPr/>
+          <p:nvPr/>
+        </p:nvSpPr>
+        <p:spPr>
+          <a:xfrm>
+            <a:off x="7921817" y="2900886"/>
+            <a:ext cx="232142" cy="232142"/>
+          </a:xfrm>
+          <a:prstGeom prst="star5">
+            <a:avLst/>
+          </a:prstGeom>
+          <a:solidFill>
+            <a:srgbClr val="FFB400"/>
+          </a:solidFill>
+        </p:spPr>
+        <p:style>
+          <a:lnRef idx="1">
+            <a:schemeClr val="accent1"/>
+          </a:lnRef>
+          <a:fillRef idx="3">
+            <a:schemeClr val="accent1"/>
+          </a:fillRef>
+          <a:effectRef idx="2">
+            <a:schemeClr val="accent1"/>
+          </a:effectRef>
+          <a:fontRef idx="minor">
+            <a:schemeClr val="lt1"/>
+          </a:fontRef>
+        </p:style>
+        <p:txBody>
+          <a:bodyPr rtlCol="0" anchor="ctr"/>
+          <a:lstStyle/>
+          <a:p>
+            <a:pPr algn="ctr"/>
+            <a:endParaRPr lang="en-US"/>
+          </a:p>
+        </p:txBody>
+      </p:sp>
+      <p:sp>
+        <p:nvSpPr>
+          <p:cNvPr id="34" name="5-Point Star 33"/>
+          <p:cNvSpPr/>
+          <p:nvPr/>
+        </p:nvSpPr>
+        <p:spPr>
+          <a:xfrm>
+            <a:off x="8156147" y="2903081"/>
+            <a:ext cx="232142" cy="232142"/>
+          </a:xfrm>
+          <a:prstGeom prst="star5">
+            <a:avLst/>
+          </a:prstGeom>
+        </p:spPr>
+        <p:style>
+          <a:lnRef idx="1">
+            <a:schemeClr val="accent1"/>
+          </a:lnRef>
+          <a:fillRef idx="3">
+            <a:schemeClr val="accent1"/>
+          </a:fillRef>
+          <a:effectRef idx="2">
+            <a:schemeClr val="accent1"/>
+          </a:effectRef>
+          <a:fontRef idx="minor">
+            <a:schemeClr val="lt1"/>
+          </a:fontRef>
+        </p:style>
+        <p:txBody>
+          <a:bodyPr rtlCol="0" anchor="ctr"/>
+          <a:lstStyle/>
+          <a:p>
+            <a:pPr algn="ctr"/>
+            <a:endParaRPr lang="en-US"/>
+          </a:p>
+        </p:txBody>
+      </p:sp>
+      <p:sp>
+        <p:nvSpPr>
+          <p:cNvPr id="35" name="5-Point Star 34"/>
+          <p:cNvSpPr/>
+          <p:nvPr/>
+        </p:nvSpPr>
+        <p:spPr>
+          <a:xfrm>
+            <a:off x="8390477" y="2905276"/>
+            <a:ext cx="232142" cy="232142"/>
+          </a:xfrm>
+          <a:prstGeom prst="star5">
+            <a:avLst/>
+          </a:prstGeom>
+        </p:spPr>
+        <p:style>
+          <a:lnRef idx="1">
+            <a:schemeClr val="accent1"/>
+          </a:lnRef>
+          <a:fillRef idx="3">
+            <a:schemeClr val="accent1"/>
+          </a:fillRef>
+          <a:effectRef idx="2">
+            <a:schemeClr val="accent1"/>
+          </a:effectRef>
+          <a:fontRef idx="minor">
+            <a:schemeClr val="lt1"/>
+          </a:fontRef>
+        </p:style>
+        <p:txBody>
+          <a:bodyPr rtlCol="0" anchor="ctr"/>
+          <a:lstStyle/>
+          <a:p>
+            <a:pPr algn="ctr"/>
+            <a:endParaRPr lang="en-US"/>
+          </a:p>
+        </p:txBody>
+      </p:sp>
+      <p:pic>
+        <p:nvPicPr>
+          <p:cNvPr id="36" name="Picture 35"/>
+          <p:cNvPicPr>
+            <a:picLocks noChangeAspect="1"/>
+          </p:cNvPicPr>
+          <p:nvPr/>
+        </p:nvPicPr>
+        <p:blipFill>
+          <a:blip r:embed="rId7"/>
+          <a:stretch>
+            <a:fillRect/>
+          </a:stretch>
+        </p:blipFill>
+        <p:spPr>
+          <a:xfrm>
+            <a:off x="140751" y="175851"/>
+            <a:ext cx="3810000" cy="1905000"/>
           </a:xfrm>
           <a:prstGeom prst="rect">
             <a:avLst/>
@@ -3956,7 +5520,11 @@
           <a:bodyPr/>
           <a:lstStyle/>
           <a:p>
-            <a:endParaRPr lang="en-US"/>
+            <a:r>
+              <a:rPr lang="en-US" dirty="0" smtClean="0"/>
+              <a:t>Methods</a:t>
+            </a:r>
+            <a:endParaRPr lang="en-US" dirty="0"/>
           </a:p>
         </p:txBody>
       </p:sp>
@@ -3975,7 +5543,23 @@
           <a:bodyPr/>
           <a:lstStyle/>
           <a:p>
-            <a:endParaRPr lang="en-US"/>
+            <a:r>
+              <a:rPr lang="en-US" dirty="0" smtClean="0"/>
+              <a:t>Agile</a:t>
+            </a:r>
+          </a:p>
+          <a:p>
+            <a:r>
+              <a:rPr lang="en-US" dirty="0" smtClean="0"/>
+              <a:t>Code Reviews</a:t>
+            </a:r>
+          </a:p>
+          <a:p>
+            <a:r>
+              <a:rPr lang="en-US" dirty="0" smtClean="0"/>
+              <a:t>Pair Programming</a:t>
+            </a:r>
+            <a:endParaRPr lang="en-US" dirty="0"/>
           </a:p>
         </p:txBody>
       </p:sp>
@@ -4026,6 +5610,162 @@
           <a:p>
             <a:r>
               <a:rPr lang="en-US" dirty="0" smtClean="0"/>
+              <a:t>Demo</a:t>
+            </a:r>
+            <a:endParaRPr lang="en-US" dirty="0"/>
+          </a:p>
+        </p:txBody>
+      </p:sp>
+      <p:sp>
+        <p:nvSpPr>
+          <p:cNvPr id="3" name="Content Placeholder 2"/>
+          <p:cNvSpPr>
+            <a:spLocks noGrp="1"/>
+          </p:cNvSpPr>
+          <p:nvPr>
+            <p:ph idx="1"/>
+          </p:nvPr>
+        </p:nvSpPr>
+        <p:spPr/>
+        <p:txBody>
+          <a:bodyPr/>
+          <a:lstStyle/>
+          <a:p>
+            <a:endParaRPr lang="en-US"/>
+          </a:p>
+        </p:txBody>
+      </p:sp>
+    </p:spTree>
+    <p:extLst>
+      <p:ext uri="{BB962C8B-B14F-4D97-AF65-F5344CB8AC3E}">
+        <p14:creationId xmlns:p14="http://schemas.microsoft.com/office/powerpoint/2010/main" val="952526416"/>
+      </p:ext>
+    </p:extLst>
+  </p:cSld>
+  <p:clrMapOvr>
+    <a:masterClrMapping/>
+  </p:clrMapOvr>
+</p:sld>
+</file>
+
+<file path=ppt/slides/slide5.xml><?xml version="1.0" encoding="utf-8"?>
+<p:sld xmlns:a="http://schemas.openxmlformats.org/drawingml/2006/main" xmlns:r="http://schemas.openxmlformats.org/officeDocument/2006/relationships" xmlns:p="http://schemas.openxmlformats.org/presentationml/2006/main">
+  <p:cSld>
+    <p:spTree>
+      <p:nvGrpSpPr>
+        <p:cNvPr id="1" name=""/>
+        <p:cNvGrpSpPr/>
+        <p:nvPr/>
+      </p:nvGrpSpPr>
+      <p:grpSpPr>
+        <a:xfrm>
+          <a:off x="0" y="0"/>
+          <a:ext cx="0" cy="0"/>
+          <a:chOff x="0" y="0"/>
+          <a:chExt cx="0" cy="0"/>
+        </a:xfrm>
+      </p:grpSpPr>
+      <p:sp>
+        <p:nvSpPr>
+          <p:cNvPr id="2" name="Title 1"/>
+          <p:cNvSpPr>
+            <a:spLocks noGrp="1"/>
+          </p:cNvSpPr>
+          <p:nvPr>
+            <p:ph type="title"/>
+          </p:nvPr>
+        </p:nvSpPr>
+        <p:spPr/>
+        <p:txBody>
+          <a:bodyPr/>
+          <a:lstStyle/>
+          <a:p>
+            <a:r>
+              <a:rPr lang="en-US" dirty="0" smtClean="0"/>
+              <a:t>Challenges</a:t>
+            </a:r>
+            <a:endParaRPr lang="en-US" dirty="0"/>
+          </a:p>
+        </p:txBody>
+      </p:sp>
+      <p:sp>
+        <p:nvSpPr>
+          <p:cNvPr id="3" name="Content Placeholder 2"/>
+          <p:cNvSpPr>
+            <a:spLocks noGrp="1"/>
+          </p:cNvSpPr>
+          <p:nvPr>
+            <p:ph idx="1"/>
+          </p:nvPr>
+        </p:nvSpPr>
+        <p:spPr/>
+        <p:txBody>
+          <a:bodyPr/>
+          <a:lstStyle/>
+          <a:p>
+            <a:r>
+              <a:rPr lang="en-US" dirty="0" smtClean="0"/>
+              <a:t>Visualizer package would not function the way we wanted it to</a:t>
+            </a:r>
+          </a:p>
+          <a:p>
+            <a:r>
+              <a:rPr lang="en-US" dirty="0" smtClean="0"/>
+              <a:t>Busy schedules</a:t>
+            </a:r>
+          </a:p>
+          <a:p>
+            <a:endParaRPr lang="en-US" dirty="0"/>
+          </a:p>
+        </p:txBody>
+      </p:sp>
+    </p:spTree>
+    <p:extLst>
+      <p:ext uri="{BB962C8B-B14F-4D97-AF65-F5344CB8AC3E}">
+        <p14:creationId xmlns:p14="http://schemas.microsoft.com/office/powerpoint/2010/main" val="1803195896"/>
+      </p:ext>
+    </p:extLst>
+  </p:cSld>
+  <p:clrMapOvr>
+    <a:masterClrMapping/>
+  </p:clrMapOvr>
+</p:sld>
+</file>
+
+<file path=ppt/slides/slide6.xml><?xml version="1.0" encoding="utf-8"?>
+<p:sld xmlns:a="http://schemas.openxmlformats.org/drawingml/2006/main" xmlns:r="http://schemas.openxmlformats.org/officeDocument/2006/relationships" xmlns:p="http://schemas.openxmlformats.org/presentationml/2006/main">
+  <p:cSld>
+    <p:spTree>
+      <p:nvGrpSpPr>
+        <p:cNvPr id="1" name=""/>
+        <p:cNvGrpSpPr/>
+        <p:nvPr/>
+      </p:nvGrpSpPr>
+      <p:grpSpPr>
+        <a:xfrm>
+          <a:off x="0" y="0"/>
+          <a:ext cx="0" cy="0"/>
+          <a:chOff x="0" y="0"/>
+          <a:chExt cx="0" cy="0"/>
+        </a:xfrm>
+      </p:grpSpPr>
+      <p:sp>
+        <p:nvSpPr>
+          <p:cNvPr id="2" name="Title 1"/>
+          <p:cNvSpPr>
+            <a:spLocks noGrp="1"/>
+          </p:cNvSpPr>
+          <p:nvPr>
+            <p:ph type="title"/>
+          </p:nvPr>
+        </p:nvSpPr>
+        <p:spPr/>
+        <p:txBody>
+          <a:bodyPr/>
+          <a:lstStyle/>
+          <a:p>
+            <a:r>
+              <a:rPr lang="en-US" dirty="0" smtClean="0"/>
               <a:t>Works Cited</a:t>
             </a:r>
             <a:endParaRPr lang="en-US" dirty="0"/>
@@ -4044,7 +5784,9 @@
         </p:nvSpPr>
         <p:spPr/>
         <p:txBody>
-          <a:bodyPr/>
+          <a:bodyPr>
+            <a:normAutofit fontScale="92500" lnSpcReduction="20000"/>
+          </a:bodyPr>
           <a:lstStyle/>
           <a:p>
             <a:r>
@@ -4084,8 +5826,54 @@
           </a:p>
           <a:p>
             <a:r>
+              <a:rPr lang="en-US" dirty="0">
+                <a:hlinkClick r:id="rId4"/>
+              </a:rPr>
+              <a:t>http://i1-news.softpedia-static.com/images/news2/Eclipse-IDE-Evolves-into-a-First-Class-Windows-7-Citizen-2.</a:t>
+            </a:r>
+            <a:r>
+              <a:rPr lang="en-US" dirty="0" smtClean="0">
+                <a:hlinkClick r:id="rId4"/>
+              </a:rPr>
+              <a:t>png</a:t>
+            </a:r>
+            <a:endParaRPr lang="en-US" dirty="0" smtClean="0"/>
+          </a:p>
+          <a:p>
+            <a:r>
+              <a:rPr lang="en-US" dirty="0">
+                <a:hlinkClick r:id="rId5"/>
+              </a:rPr>
+              <a:t>http://luauf.com/wp-content/uploads/2008/05/logo_postgres-791620.</a:t>
+            </a:r>
+            <a:r>
+              <a:rPr lang="en-US" dirty="0" smtClean="0">
+                <a:hlinkClick r:id="rId5"/>
+              </a:rPr>
+              <a:t>gif</a:t>
+            </a:r>
+            <a:endParaRPr lang="en-US" dirty="0" smtClean="0"/>
+          </a:p>
+          <a:p>
+            <a:r>
               <a:rPr lang="en-US" dirty="0"/>
-              <a:t>http://i1-news.softpedia-static.com/images/news2/Eclipse-IDE-Evolves-into-a-First-Class-Windows-7-Citizen-2.png</a:t>
+              <a:t>http://</a:t>
+            </a:r>
+            <a:r>
+              <a:rPr lang="en-US" dirty="0" err="1"/>
+              <a:t>www.konakart.com</a:t>
+            </a:r>
+            <a:r>
+              <a:rPr lang="en-US" dirty="0"/>
+              <a:t>/documentation/</a:t>
+            </a:r>
+            <a:r>
+              <a:rPr lang="en-US" dirty="0" err="1"/>
+              <a:t>javadoc</a:t>
+            </a:r>
+            <a:r>
+              <a:rPr lang="en-US" dirty="0"/>
+              <a:t>/</a:t>
             </a:r>
             <a:endParaRPr lang="en-US" dirty="0" smtClean="0"/>
           </a:p>
@@ -4371,4 +6159,324 @@
   </a:objectDefaults>
   <a:extraClrSchemeLst/>
 </a:theme>
+</file>
+
+<file path=ppt/theme/theme2.xml><?xml version="1.0" encoding="utf-8"?>
+<a:theme xmlns:a="http://schemas.openxmlformats.org/drawingml/2006/main" name="Office Theme">
+  <a:themeElements>
+    <a:clrScheme name="Office">
+      <a:dk1>
+        <a:sysClr val="windowText" lastClr="000000"/>
+      </a:dk1>
+      <a:lt1>
+        <a:sysClr val="window" lastClr="FFFFFF"/>
+      </a:lt1>
+      <a:dk2>
+        <a:srgbClr val="1F497D"/>
+      </a:dk2>
+      <a:lt2>
+        <a:srgbClr val="EEECE1"/>
+      </a:lt2>
+      <a:accent1>
+        <a:srgbClr val="4F81BD"/>
+      </a:accent1>
+      <a:accent2>
+        <a:srgbClr val="C0504D"/>
+      </a:accent2>
+      <a:accent3>
+        <a:srgbClr val="9BBB59"/>
+      </a:accent3>
+      <a:accent4>
+        <a:srgbClr val="8064A2"/>
+      </a:accent4>
+      <a:accent5>
+        <a:srgbClr val="4BACC6"/>
+      </a:accent5>
+      <a:accent6>
+        <a:srgbClr val="F79646"/>
+      </a:accent6>
+      <a:hlink>
+        <a:srgbClr val="0000FF"/>
+      </a:hlink>
+      <a:folHlink>
+        <a:srgbClr val="800080"/>
+      </a:folHlink>
+    </a:clrScheme>
+    <a:fontScheme name="Office">
+      <a:majorFont>
+        <a:latin typeface="Calibri"/>
+        <a:ea typeface=""/>
+        <a:cs typeface=""/>
+        <a:font script="Jpan" typeface="ＭＳ Ｐゴシック"/>
+        <a:font script="Hang" typeface="맑은 고딕"/>
+        <a:font script="Hans" typeface="宋体"/>
+        <a:font script="Hant" typeface="新細明體"/>
+        <a:font script="Arab" typeface="Times New Roman"/>
+        <a:font script="Hebr" typeface="Times New Roman"/>
+        <a:font script="Thai" typeface="Angsana New"/>
+        <a:font script="Ethi" typeface="Nyala"/>
+        <a:font script="Beng" typeface="Vrinda"/>
+        <a:font script="Gujr" typeface="Shruti"/>
+        <a:font script="Khmr" typeface="MoolBoran"/>
+        <a:font script="Knda" typeface="Tunga"/>
+        <a:font script="Guru" typeface="Raavi"/>
+        <a:font script="Cans" typeface="Euphemia"/>
+        <a:font script="Cher" typeface="Plantagenet Cherokee"/>
+        <a:font script="Yiii" typeface="Microsoft Yi Baiti"/>
+        <a:font script="Tibt" typeface="Microsoft Himalaya"/>
+        <a:font script="Thaa" typeface="MV Boli"/>
+        <a:font script="Deva" typeface="Mangal"/>
+        <a:font script="Telu" typeface="Gautami"/>
+        <a:font script="Taml" typeface="Latha"/>
+        <a:font script="Syrc" typeface="Estrangelo Edessa"/>
+        <a:font script="Orya" typeface="Kalinga"/>
+        <a:font script="Mlym" typeface="Kartika"/>
+        <a:font script="Laoo" typeface="DokChampa"/>
+        <a:font script="Sinh" typeface="Iskoola Pota"/>
+        <a:font script="Mong" typeface="Mongolian Baiti"/>
+        <a:font script="Viet" typeface="Times New Roman"/>
+        <a:font script="Uigh" typeface="Microsoft Uighur"/>
+        <a:font script="Geor" typeface="Sylfaen"/>
+      </a:majorFont>
+      <a:minorFont>
+        <a:latin typeface="Calibri"/>
+        <a:ea typeface=""/>
+        <a:cs typeface=""/>
+        <a:font script="Jpan" typeface="ＭＳ Ｐゴシック"/>
+        <a:font script="Hang" typeface="맑은 고딕"/>
+        <a:font script="Hans" typeface="宋体"/>
+        <a:font script="Hant" typeface="新細明體"/>
+        <a:font script="Arab" typeface="Arial"/>
+        <a:font script="Hebr" typeface="Arial"/>
+        <a:font script="Thai" typeface="Cordia New"/>
+        <a:font script="Ethi" typeface="Nyala"/>
+        <a:font script="Beng" typeface="Vrinda"/>
+        <a:font script="Gujr" typeface="Shruti"/>
+        <a:font script="Khmr" typeface="DaunPenh"/>
+        <a:font script="Knda" typeface="Tunga"/>
+        <a:font script="Guru" typeface="Raavi"/>
+        <a:font script="Cans" typeface="Euphemia"/>
+        <a:font script="Cher" typeface="Plantagenet Cherokee"/>
+        <a:font script="Yiii" typeface="Microsoft Yi Baiti"/>
+        <a:font script="Tibt" typeface="Microsoft Himalaya"/>
+        <a:font script="Thaa" typeface="MV Boli"/>
+        <a:font script="Deva" typeface="Mangal"/>
+        <a:font script="Telu" typeface="Gautami"/>
+        <a:font script="Taml" typeface="Latha"/>
+        <a:font script="Syrc" typeface="Estrangelo Edessa"/>
+        <a:font script="Orya" typeface="Kalinga"/>
+        <a:font script="Mlym" typeface="Kartika"/>
+        <a:font script="Laoo" typeface="DokChampa"/>
+        <a:font script="Sinh" typeface="Iskoola Pota"/>
+        <a:font script="Mong" typeface="Mongolian Baiti"/>
+        <a:font script="Viet" typeface="Arial"/>
+        <a:font script="Uigh" typeface="Microsoft Uighur"/>
+        <a:font script="Geor" typeface="Sylfaen"/>
+      </a:minorFont>
+    </a:fontScheme>
+    <a:fmtScheme name="Office">
+      <a:fillStyleLst>
+        <a:solidFill>
+          <a:schemeClr val="phClr"/>
+        </a:solidFill>
+        <a:gradFill rotWithShape="1">
+          <a:gsLst>
+            <a:gs pos="0">
+              <a:schemeClr val="phClr">
+                <a:tint val="50000"/>
+                <a:satMod val="300000"/>
+              </a:schemeClr>
+            </a:gs>
+            <a:gs pos="35000">
+              <a:schemeClr val="phClr">
+                <a:tint val="37000"/>
+                <a:satMod val="300000"/>
+              </a:schemeClr>
+            </a:gs>
+            <a:gs pos="100000">
+              <a:schemeClr val="phClr">
+                <a:tint val="15000"/>
+                <a:satMod val="350000"/>
+              </a:schemeClr>
+            </a:gs>
+          </a:gsLst>
+          <a:lin ang="16200000" scaled="1"/>
+        </a:gradFill>
+        <a:gradFill rotWithShape="1">
+          <a:gsLst>
+            <a:gs pos="0">
+              <a:schemeClr val="phClr">
+                <a:tint val="100000"/>
+                <a:shade val="100000"/>
+                <a:satMod val="130000"/>
+              </a:schemeClr>
+            </a:gs>
+            <a:gs pos="100000">
+              <a:schemeClr val="phClr">
+                <a:tint val="50000"/>
+                <a:shade val="100000"/>
+                <a:satMod val="350000"/>
+              </a:schemeClr>
+            </a:gs>
+          </a:gsLst>
+          <a:lin ang="16200000" scaled="0"/>
+        </a:gradFill>
+      </a:fillStyleLst>
+      <a:lnStyleLst>
+        <a:ln w="9525" cap="flat" cmpd="sng" algn="ctr">
+          <a:solidFill>
+            <a:schemeClr val="phClr">
+              <a:shade val="95000"/>
+              <a:satMod val="105000"/>
+            </a:schemeClr>
+          </a:solidFill>
+          <a:prstDash val="solid"/>
+        </a:ln>
+        <a:ln w="25400" cap="flat" cmpd="sng" algn="ctr">
+          <a:solidFill>
+            <a:schemeClr val="phClr"/>
+          </a:solidFill>
+          <a:prstDash val="solid"/>
+        </a:ln>
+        <a:ln w="38100" cap="flat" cmpd="sng" algn="ctr">
+          <a:solidFill>
+            <a:schemeClr val="phClr"/>
+          </a:solidFill>
+          <a:prstDash val="solid"/>
+        </a:ln>
+      </a:lnStyleLst>
+      <a:effectStyleLst>
+        <a:effectStyle>
+          <a:effectLst>
+            <a:outerShdw blurRad="40000" dist="20000" dir="5400000" rotWithShape="0">
+              <a:srgbClr val="000000">
+                <a:alpha val="38000"/>
+              </a:srgbClr>
+            </a:outerShdw>
+          </a:effectLst>
+        </a:effectStyle>
+        <a:effectStyle>
+          <a:effectLst>
+            <a:outerShdw blurRad="40000" dist="23000" dir="5400000" rotWithShape="0">
+              <a:srgbClr val="000000">
+                <a:alpha val="35000"/>
+              </a:srgbClr>
+            </a:outerShdw>
+          </a:effectLst>
+        </a:effectStyle>
+        <a:effectStyle>
+          <a:effectLst>
+            <a:outerShdw blurRad="40000" dist="23000" dir="5400000" rotWithShape="0">
+              <a:srgbClr val="000000">
+                <a:alpha val="35000"/>
+              </a:srgbClr>
+            </a:outerShdw>
+          </a:effectLst>
+          <a:scene3d>
+            <a:camera prst="orthographicFront">
+              <a:rot lat="0" lon="0" rev="0"/>
+            </a:camera>
+            <a:lightRig rig="threePt" dir="t">
+              <a:rot lat="0" lon="0" rev="1200000"/>
+            </a:lightRig>
+          </a:scene3d>
+          <a:sp3d>
+            <a:bevelT w="63500" h="25400"/>
+          </a:sp3d>
+        </a:effectStyle>
+      </a:effectStyleLst>
+      <a:bgFillStyleLst>
+        <a:solidFill>
+          <a:schemeClr val="phClr"/>
+        </a:solidFill>
+        <a:gradFill rotWithShape="1">
+          <a:gsLst>
+            <a:gs pos="0">
+              <a:schemeClr val="phClr">
+                <a:tint val="40000"/>
+                <a:satMod val="350000"/>
+              </a:schemeClr>
+            </a:gs>
+            <a:gs pos="40000">
+              <a:schemeClr val="phClr">
+                <a:tint val="45000"/>
+                <a:shade val="99000"/>
+                <a:satMod val="350000"/>
+              </a:schemeClr>
+            </a:gs>
+            <a:gs pos="100000">
+              <a:schemeClr val="phClr">
+                <a:shade val="20000"/>
+                <a:satMod val="255000"/>
+              </a:schemeClr>
+            </a:gs>
+          </a:gsLst>
+          <a:path path="circle">
+            <a:fillToRect l="50000" t="-80000" r="50000" b="180000"/>
+          </a:path>
+        </a:gradFill>
+        <a:gradFill rotWithShape="1">
+          <a:gsLst>
+            <a:gs pos="0">
+              <a:schemeClr val="phClr">
+                <a:tint val="80000"/>
+                <a:satMod val="300000"/>
+              </a:schemeClr>
+            </a:gs>
+            <a:gs pos="100000">
+              <a:schemeClr val="phClr">
+                <a:shade val="30000"/>
+                <a:satMod val="200000"/>
+              </a:schemeClr>
+            </a:gs>
+          </a:gsLst>
+          <a:path path="circle">
+            <a:fillToRect l="50000" t="50000" r="50000" b="50000"/>
+          </a:path>
+        </a:gradFill>
+      </a:bgFillStyleLst>
+    </a:fmtScheme>
+  </a:themeElements>
+  <a:objectDefaults>
+    <a:spDef>
+      <a:spPr/>
+      <a:bodyPr/>
+      <a:lstStyle/>
+      <a:style>
+        <a:lnRef idx="1">
+          <a:schemeClr val="accent1"/>
+        </a:lnRef>
+        <a:fillRef idx="3">
+          <a:schemeClr val="accent1"/>
+        </a:fillRef>
+        <a:effectRef idx="2">
+          <a:schemeClr val="accent1"/>
+        </a:effectRef>
+        <a:fontRef idx="minor">
+          <a:schemeClr val="lt1"/>
+        </a:fontRef>
+      </a:style>
+    </a:spDef>
+    <a:lnDef>
+      <a:spPr/>
+      <a:bodyPr/>
+      <a:lstStyle/>
+      <a:style>
+        <a:lnRef idx="2">
+          <a:schemeClr val="accent1"/>
+        </a:lnRef>
+        <a:fillRef idx="0">
+          <a:schemeClr val="accent1"/>
+        </a:fillRef>
+        <a:effectRef idx="1">
+          <a:schemeClr val="accent1"/>
+        </a:effectRef>
+        <a:fontRef idx="minor">
+          <a:schemeClr val="tx1"/>
+        </a:fontRef>
+      </a:style>
+    </a:lnDef>
+  </a:objectDefaults>
+  <a:extraClrSchemeLst/>
+</a:theme>
 </file>
</xml_diff>

<commit_message>
Started editing the README as indicated in the Part 6 directions.
</commit_message>
<xml_diff>
--- a/Part5Presentation.pptx
+++ b/Part5Presentation.pptx
@@ -519,8 +519,13 @@
             </a:r>
             <a:r>
               <a:rPr lang="en-US" baseline="0" dirty="0" smtClean="0"/>
-              <a:t> it did what it wanted but it wasn’t exactly what we would have wanted. Maybe it was just the way we used it but the stories needed to be smaller and we didn’t actually use it</a:t>
-            </a:r>
+              <a:t> it did what it wanted but it wasn’t exactly what we would have wanted. Maybe it was just the way we used it but the stories needed to be smaller and we didn’t actually use it because it was more convenient for us to talk or group text about what we had to do, doing, done, etc. Maybe if we had a bigger group or were part of a company the tracker would have been more </a:t>
+            </a:r>
+            <a:r>
+              <a:rPr lang="en-US" baseline="0" smtClean="0"/>
+              <a:t>useful for us</a:t>
+            </a:r>
+            <a:endParaRPr lang="en-US" baseline="0" dirty="0" smtClean="0"/>
           </a:p>
           <a:p>
             <a:r>

</xml_diff>

<commit_message>
Link on ppt changed
</commit_message>
<xml_diff>
--- a/Part5Presentation.pptx
+++ b/Part5Presentation.pptx
@@ -519,13 +519,8 @@
             </a:r>
             <a:r>
               <a:rPr lang="en-US" baseline="0" dirty="0" smtClean="0"/>
-              <a:t> it did what it wanted but it wasn’t exactly what we would have wanted. Maybe it was just the way we used it but the stories needed to be smaller and we didn’t actually use it because it was more convenient for us to talk or group text about what we had to do, doing, done, etc. Maybe if we had a bigger group or were part of a company the tracker would have been more </a:t>
-            </a:r>
-            <a:r>
-              <a:rPr lang="en-US" baseline="0" smtClean="0"/>
-              <a:t>useful for us</a:t>
-            </a:r>
-            <a:endParaRPr lang="en-US" baseline="0" dirty="0" smtClean="0"/>
+              <a:t> it did what it wanted but it wasn’t exactly what we would have wanted. Maybe it was just the way we used it but the stories needed to be smaller and we didn’t actually use it because it was more convenient for us to talk or group text about what we had to do, doing, done, etc. Maybe if we had a bigger group or were part of a company the tracker would have been more useful for us</a:t>
+            </a:r>
           </a:p>
           <a:p>
             <a:r>
@@ -5861,25 +5856,20 @@
           </a:p>
           <a:p>
             <a:r>
-              <a:rPr lang="en-US" dirty="0"/>
-              <a:t>http://</a:t>
-            </a:r>
-            <a:r>
-              <a:rPr lang="en-US" dirty="0" err="1"/>
-              <a:t>www.konakart.com</a:t>
-            </a:r>
-            <a:r>
-              <a:rPr lang="en-US" dirty="0"/>
-              <a:t>/documentation/</a:t>
-            </a:r>
-            <a:r>
-              <a:rPr lang="en-US" dirty="0" err="1"/>
-              <a:t>javadoc</a:t>
-            </a:r>
-            <a:r>
-              <a:rPr lang="en-US" dirty="0"/>
+              <a:rPr lang="en-US" dirty="0">
+                <a:hlinkClick r:id="rId6"/>
+              </a:rPr>
+              <a:t>http://www.konakart.com/documentation/javadoc</a:t>
+            </a:r>
+            <a:r>
+              <a:rPr lang="en-US" dirty="0" smtClean="0">
+                <a:hlinkClick r:id="rId6"/>
+              </a:rPr>
               <a:t>/</a:t>
             </a:r>
+            <a:endParaRPr lang="en-US" dirty="0" smtClean="0"/>
+          </a:p>
+          <a:p>
             <a:endParaRPr lang="en-US" dirty="0" smtClean="0"/>
           </a:p>
           <a:p>

</xml_diff>